<commit_message>
Homework 3 presentation final version
</commit_message>
<xml_diff>
--- a/homework/DAT8SYD Homework 3.pptx
+++ b/homework/DAT8SYD Homework 3.pptx
@@ -300,7 +300,7 @@
           <a:p>
             <a:fld id="{48A87A34-81AB-432B-8DAE-1953F412C126}" type="datetimeFigureOut">
               <a:rPr lang="en-US" dirty="0"/>
-              <a:t>7/16/2017</a:t>
+              <a:t>7/17/2017</a:t>
             </a:fld>
             <a:endParaRPr lang="en-US" dirty="0"/>
           </a:p>
@@ -562,7 +562,7 @@
           <a:p>
             <a:fld id="{48A87A34-81AB-432B-8DAE-1953F412C126}" type="datetimeFigureOut">
               <a:rPr lang="en-US" dirty="0"/>
-              <a:t>7/16/2017</a:t>
+              <a:t>7/17/2017</a:t>
             </a:fld>
             <a:endParaRPr lang="en-US" dirty="0"/>
           </a:p>
@@ -789,7 +789,7 @@
             <a:fld id="{48A87A34-81AB-432B-8DAE-1953F412C126}" type="datetimeFigureOut">
               <a:rPr lang="en-US" dirty="0"/>
               <a:pPr/>
-              <a:t>7/16/2017</a:t>
+              <a:t>7/17/2017</a:t>
             </a:fld>
             <a:endParaRPr lang="en-US" dirty="0"/>
           </a:p>
@@ -1095,7 +1095,7 @@
             <a:fld id="{48A87A34-81AB-432B-8DAE-1953F412C126}" type="datetimeFigureOut">
               <a:rPr lang="en-US" dirty="0"/>
               <a:pPr/>
-              <a:t>7/16/2017</a:t>
+              <a:t>7/17/2017</a:t>
             </a:fld>
             <a:endParaRPr lang="en-US" dirty="0"/>
           </a:p>
@@ -1564,7 +1564,7 @@
             <a:fld id="{48A87A34-81AB-432B-8DAE-1953F412C126}" type="datetimeFigureOut">
               <a:rPr lang="en-US" dirty="0"/>
               <a:pPr/>
-              <a:t>7/16/2017</a:t>
+              <a:t>7/17/2017</a:t>
             </a:fld>
             <a:endParaRPr lang="en-US" dirty="0"/>
           </a:p>
@@ -2106,7 +2106,7 @@
           <a:p>
             <a:fld id="{48A87A34-81AB-432B-8DAE-1953F412C126}" type="datetimeFigureOut">
               <a:rPr lang="en-US" dirty="0"/>
-              <a:t>7/16/2017</a:t>
+              <a:t>7/17/2017</a:t>
             </a:fld>
             <a:endParaRPr lang="en-US" dirty="0"/>
           </a:p>
@@ -2875,7 +2875,7 @@
           <a:p>
             <a:fld id="{48A87A34-81AB-432B-8DAE-1953F412C126}" type="datetimeFigureOut">
               <a:rPr lang="en-US" dirty="0"/>
-              <a:t>7/16/2017</a:t>
+              <a:t>7/17/2017</a:t>
             </a:fld>
             <a:endParaRPr lang="en-US" dirty="0"/>
           </a:p>
@@ -3045,7 +3045,7 @@
           <a:p>
             <a:fld id="{48A87A34-81AB-432B-8DAE-1953F412C126}" type="datetimeFigureOut">
               <a:rPr lang="en-US" dirty="0"/>
-              <a:t>7/16/2017</a:t>
+              <a:t>7/17/2017</a:t>
             </a:fld>
             <a:endParaRPr lang="en-US" dirty="0"/>
           </a:p>
@@ -3264,7 +3264,7 @@
             <a:fld id="{48A87A34-81AB-432B-8DAE-1953F412C126}" type="datetimeFigureOut">
               <a:rPr lang="en-US" dirty="0"/>
               <a:pPr/>
-              <a:t>7/16/2017</a:t>
+              <a:t>7/17/2017</a:t>
             </a:fld>
             <a:endParaRPr lang="en-US" dirty="0"/>
           </a:p>
@@ -3439,7 +3439,7 @@
           <a:p>
             <a:fld id="{48A87A34-81AB-432B-8DAE-1953F412C126}" type="datetimeFigureOut">
               <a:rPr lang="en-US" dirty="0"/>
-              <a:t>7/16/2017</a:t>
+              <a:t>7/17/2017</a:t>
             </a:fld>
             <a:endParaRPr lang="en-US" dirty="0"/>
           </a:p>
@@ -3724,7 +3724,7 @@
             <a:fld id="{48A87A34-81AB-432B-8DAE-1953F412C126}" type="datetimeFigureOut">
               <a:rPr lang="en-US" dirty="0"/>
               <a:pPr/>
-              <a:t>7/16/2017</a:t>
+              <a:t>7/17/2017</a:t>
             </a:fld>
             <a:endParaRPr lang="en-US" dirty="0"/>
           </a:p>
@@ -3961,7 +3961,7 @@
           <a:p>
             <a:fld id="{48A87A34-81AB-432B-8DAE-1953F412C126}" type="datetimeFigureOut">
               <a:rPr lang="en-US" dirty="0"/>
-              <a:t>7/16/2017</a:t>
+              <a:t>7/17/2017</a:t>
             </a:fld>
             <a:endParaRPr lang="en-US" dirty="0"/>
           </a:p>
@@ -4335,7 +4335,7 @@
           <a:p>
             <a:fld id="{48A87A34-81AB-432B-8DAE-1953F412C126}" type="datetimeFigureOut">
               <a:rPr lang="en-US" dirty="0"/>
-              <a:t>7/16/2017</a:t>
+              <a:t>7/17/2017</a:t>
             </a:fld>
             <a:endParaRPr lang="en-US" dirty="0"/>
           </a:p>
@@ -4448,7 +4448,7 @@
           <a:p>
             <a:fld id="{48A87A34-81AB-432B-8DAE-1953F412C126}" type="datetimeFigureOut">
               <a:rPr lang="en-US" dirty="0"/>
-              <a:t>7/16/2017</a:t>
+              <a:t>7/17/2017</a:t>
             </a:fld>
             <a:endParaRPr lang="en-US" dirty="0"/>
           </a:p>
@@ -4538,7 +4538,7 @@
           <a:p>
             <a:fld id="{48A87A34-81AB-432B-8DAE-1953F412C126}" type="datetimeFigureOut">
               <a:rPr lang="en-US" dirty="0"/>
-              <a:t>7/16/2017</a:t>
+              <a:t>7/17/2017</a:t>
             </a:fld>
             <a:endParaRPr lang="en-US" dirty="0"/>
           </a:p>
@@ -4782,7 +4782,7 @@
           <a:p>
             <a:fld id="{48A87A34-81AB-432B-8DAE-1953F412C126}" type="datetimeFigureOut">
               <a:rPr lang="en-US" dirty="0"/>
-              <a:t>7/16/2017</a:t>
+              <a:t>7/17/2017</a:t>
             </a:fld>
             <a:endParaRPr lang="en-US" dirty="0"/>
           </a:p>
@@ -5034,7 +5034,7 @@
           <a:p>
             <a:fld id="{48A87A34-81AB-432B-8DAE-1953F412C126}" type="datetimeFigureOut">
               <a:rPr lang="en-US" dirty="0"/>
-              <a:t>7/16/2017</a:t>
+              <a:t>7/17/2017</a:t>
             </a:fld>
             <a:endParaRPr lang="en-US" dirty="0"/>
           </a:p>
@@ -5273,7 +5273,7 @@
             <a:fld id="{48A87A34-81AB-432B-8DAE-1953F412C126}" type="datetimeFigureOut">
               <a:rPr lang="en-US" dirty="0"/>
               <a:pPr/>
-              <a:t>7/16/2017</a:t>
+              <a:t>7/17/2017</a:t>
             </a:fld>
             <a:endParaRPr lang="en-US" dirty="0"/>
           </a:p>
@@ -5817,7 +5817,7 @@
         <p:spPr/>
         <p:txBody>
           <a:bodyPr>
-            <a:normAutofit/>
+            <a:normAutofit lnSpcReduction="10000"/>
           </a:bodyPr>
           <a:lstStyle/>
           <a:p>
@@ -5892,6 +5892,13 @@
             <a:r>
               <a:rPr lang="en-AU" sz="2000" dirty="0"/>
               <a:t>$25k prize money</a:t>
+            </a:r>
+          </a:p>
+          <a:p>
+            <a:pPr lvl="1"/>
+            <a:r>
+              <a:rPr lang="en-AU" sz="1800" dirty="0"/>
+              <a:t>1,689 teams entered</a:t>
             </a:r>
           </a:p>
           <a:p>
@@ -6503,10 +6510,93 @@
         </p:nvSpPr>
         <p:spPr/>
         <p:txBody>
-          <a:bodyPr/>
-          <a:lstStyle/>
-          <a:p>
-            <a:endParaRPr lang="en-US"/>
+          <a:bodyPr>
+            <a:normAutofit lnSpcReduction="10000"/>
+          </a:bodyPr>
+          <a:lstStyle/>
+          <a:p>
+            <a:pPr marL="714375" indent="0" algn="ctr">
+              <a:buNone/>
+            </a:pPr>
+            <a:r>
+              <a:rPr lang="en-AU" sz="1800" dirty="0"/>
+              <a:t>“the creation of unexpected additional information in the training data, allowing a model or machine learning algorithm to make unrealistically good predictions”</a:t>
+            </a:r>
+            <a:r>
+              <a:rPr lang="en-AU" sz="1800" baseline="30000" dirty="0"/>
+              <a:t>1</a:t>
+            </a:r>
+          </a:p>
+          <a:p>
+            <a:endParaRPr lang="en-AU" sz="1800" dirty="0"/>
+          </a:p>
+          <a:p>
+            <a:r>
+              <a:rPr lang="en-AU" sz="1800" dirty="0"/>
+              <a:t>Data leakage in training set</a:t>
+            </a:r>
+          </a:p>
+          <a:p>
+            <a:pPr lvl="1"/>
+            <a:r>
+              <a:rPr lang="en-AU" sz="1600" dirty="0"/>
+              <a:t>Individuals had multiple user IDs</a:t>
+            </a:r>
+          </a:p>
+          <a:p>
+            <a:pPr lvl="1"/>
+            <a:r>
+              <a:rPr lang="en-AU" sz="1600" dirty="0"/>
+              <a:t>Same user in both training and test data sets</a:t>
+            </a:r>
+          </a:p>
+          <a:p>
+            <a:pPr lvl="1"/>
+            <a:r>
+              <a:rPr lang="en-AU" sz="1600" dirty="0"/>
+              <a:t>Duplicate IDs were grouped together</a:t>
+            </a:r>
+          </a:p>
+          <a:p>
+            <a:r>
+              <a:rPr lang="en-AU" sz="1800" dirty="0"/>
+              <a:t>Flagged by one contestant</a:t>
+            </a:r>
+          </a:p>
+          <a:p>
+            <a:pPr lvl="1"/>
+            <a:r>
+              <a:rPr lang="en-AU" sz="1600" dirty="0"/>
+              <a:t>Cross-validation showed significantly difference between folds</a:t>
+            </a:r>
+          </a:p>
+          <a:p>
+            <a:pPr lvl="1"/>
+            <a:r>
+              <a:rPr lang="en-AU" sz="1600" dirty="0"/>
+              <a:t>Competition was not changed</a:t>
+            </a:r>
+          </a:p>
+          <a:p>
+            <a:pPr lvl="1"/>
+            <a:r>
+              <a:rPr lang="en-AU" sz="1600" dirty="0"/>
+              <a:t>Leakage was allowed to be exploited</a:t>
+            </a:r>
+          </a:p>
+          <a:p>
+            <a:r>
+              <a:rPr lang="en-AU" sz="1800" dirty="0"/>
+              <a:t>Proposing Data Leakage prize</a:t>
+            </a:r>
+          </a:p>
+          <a:p>
+            <a:pPr lvl="1"/>
+            <a:r>
+              <a:rPr lang="en-AU" sz="1600" dirty="0"/>
+              <a:t>20% to first person to find</a:t>
+            </a:r>
+            <a:endParaRPr lang="en-US" sz="1600" dirty="0"/>
           </a:p>
         </p:txBody>
       </p:sp>
@@ -6555,6 +6645,76 @@
               </a14:hiddenFill>
             </a:ext>
           </a:extLst>
+        </p:spPr>
+      </p:pic>
+      <p:sp>
+        <p:nvSpPr>
+          <p:cNvPr id="5" name="TextBox 4">
+            <a:extLst>
+              <a:ext uri="{FF2B5EF4-FFF2-40B4-BE49-F238E27FC236}">
+                <a16:creationId xmlns:a16="http://schemas.microsoft.com/office/drawing/2014/main" id="{54FB508B-A211-4B1E-9467-3FBE561052E3}"/>
+              </a:ext>
+            </a:extLst>
+          </p:cNvPr>
+          <p:cNvSpPr txBox="1"/>
+          <p:nvPr/>
+        </p:nvSpPr>
+        <p:spPr>
+          <a:xfrm>
+            <a:off x="501069" y="6355844"/>
+            <a:ext cx="3672800" cy="307777"/>
+          </a:xfrm>
+          <a:prstGeom prst="rect">
+            <a:avLst/>
+          </a:prstGeom>
+          <a:noFill/>
+        </p:spPr>
+        <p:txBody>
+          <a:bodyPr wrap="none" rtlCol="0">
+            <a:spAutoFit/>
+          </a:bodyPr>
+          <a:lstStyle/>
+          <a:p>
+            <a:r>
+              <a:rPr lang="en-AU" sz="1400" baseline="30000" dirty="0"/>
+              <a:t>1</a:t>
+            </a:r>
+            <a:r>
+              <a:rPr lang="en-AU" sz="1400" dirty="0"/>
+              <a:t>https://www.kaggle.com/wiki/Leakage</a:t>
+            </a:r>
+            <a:endParaRPr lang="en-US" sz="1400" dirty="0"/>
+          </a:p>
+        </p:txBody>
+      </p:sp>
+      <p:pic>
+        <p:nvPicPr>
+          <p:cNvPr id="8" name="Picture 7">
+            <a:extLst>
+              <a:ext uri="{FF2B5EF4-FFF2-40B4-BE49-F238E27FC236}">
+                <a16:creationId xmlns:a16="http://schemas.microsoft.com/office/drawing/2014/main" id="{C325259A-2CA5-479A-892C-57FB9863EDA7}"/>
+              </a:ext>
+            </a:extLst>
+          </p:cNvPr>
+          <p:cNvPicPr>
+            <a:picLocks noChangeAspect="1"/>
+          </p:cNvPicPr>
+          <p:nvPr/>
+        </p:nvPicPr>
+        <p:blipFill>
+          <a:blip r:embed="rId3"/>
+          <a:stretch>
+            <a:fillRect/>
+          </a:stretch>
+        </p:blipFill>
+        <p:spPr>
+          <a:xfrm>
+            <a:off x="8253982" y="2863453"/>
+            <a:ext cx="3646936" cy="3800168"/>
+          </a:xfrm>
+          <a:prstGeom prst="rect">
+            <a:avLst/>
+          </a:prstGeom>
         </p:spPr>
       </p:pic>
     </p:spTree>

</xml_diff>